<commit_message>
add descriptions of project
</commit_message>
<xml_diff>
--- a/project_descriptoin.pptx
+++ b/project_descriptoin.pptx
@@ -109,7 +109,27 @@
       </a:defRPr>
     </a:lvl9pPr>
   </p:defaultTextStyle>
+  <p:extLst>
+    <p:ext uri="{EFAFB233-063F-42B5-8137-9DF3F51BA10A}">
+      <p15:sldGuideLst xmlns:p15="http://schemas.microsoft.com/office/powerpoint/2012/main">
+        <p15:guide id="1" orient="horz" pos="2160">
+          <p15:clr>
+            <a:srgbClr val="A4A3A4"/>
+          </p15:clr>
+        </p15:guide>
+        <p15:guide id="2" pos="2880">
+          <p15:clr>
+            <a:srgbClr val="A4A3A4"/>
+          </p15:clr>
+        </p15:guide>
+      </p15:sldGuideLst>
+    </p:ext>
+  </p:extLst>
 </p:presentation>
+</file>
+
+<file path=ppt/revisionInfo.xml><?xml version="1.0" encoding="utf-8"?>
+<p1510:revInfo xmlns:a="http://schemas.openxmlformats.org/drawingml/2006/main" xmlns:r="http://schemas.openxmlformats.org/officeDocument/2006/relationships" xmlns:p1510="http://schemas.microsoft.com/office/powerpoint/2015/10/main"/>
 </file>
 
 <file path=ppt/slideLayouts/slideLayout1.xml><?xml version="1.0" encoding="utf-8"?>
@@ -150,10 +170,9 @@
           <a:lstStyle/>
           <a:p>
             <a:r>
-              <a:rPr lang="en-US" smtClean="0"/>
+              <a:rPr lang="en-US"/>
               <a:t>Click to edit Master title style</a:t>
             </a:r>
-            <a:endParaRPr lang="en-US"/>
           </a:p>
         </p:txBody>
       </p:sp>
@@ -269,10 +288,9 @@
           </a:lstStyle>
           <a:p>
             <a:r>
-              <a:rPr lang="en-US" smtClean="0"/>
+              <a:rPr lang="en-US"/>
               <a:t>Click to edit Master subtitle style</a:t>
             </a:r>
-            <a:endParaRPr lang="en-US"/>
           </a:p>
         </p:txBody>
       </p:sp>
@@ -294,7 +312,7 @@
             <a:fld id="{1D8BD707-D9CF-40AE-B4C6-C98DA3205C09}" type="datetimeFigureOut">
               <a:rPr lang="en-US" smtClean="0"/>
               <a:pPr/>
-              <a:t>12/14/2017</a:t>
+              <a:t>12/19/2017</a:t>
             </a:fld>
             <a:endParaRPr lang="en-US"/>
           </a:p>
@@ -384,10 +402,9 @@
           <a:lstStyle/>
           <a:p>
             <a:r>
-              <a:rPr lang="en-US" smtClean="0"/>
+              <a:rPr lang="en-US"/>
               <a:t>Click to edit Master title style</a:t>
             </a:r>
-            <a:endParaRPr lang="en-US"/>
           </a:p>
         </p:txBody>
       </p:sp>
@@ -408,38 +425,37 @@
           <a:p>
             <a:pPr lvl="0"/>
             <a:r>
-              <a:rPr lang="en-US" smtClean="0"/>
+              <a:rPr lang="en-US"/>
               <a:t>Click to edit Master text styles</a:t>
             </a:r>
           </a:p>
           <a:p>
             <a:pPr lvl="1"/>
             <a:r>
-              <a:rPr lang="en-US" smtClean="0"/>
+              <a:rPr lang="en-US"/>
               <a:t>Second level</a:t>
             </a:r>
           </a:p>
           <a:p>
             <a:pPr lvl="2"/>
             <a:r>
-              <a:rPr lang="en-US" smtClean="0"/>
+              <a:rPr lang="en-US"/>
               <a:t>Third level</a:t>
             </a:r>
           </a:p>
           <a:p>
             <a:pPr lvl="3"/>
             <a:r>
-              <a:rPr lang="en-US" smtClean="0"/>
+              <a:rPr lang="en-US"/>
               <a:t>Fourth level</a:t>
             </a:r>
           </a:p>
           <a:p>
             <a:pPr lvl="4"/>
             <a:r>
-              <a:rPr lang="en-US" smtClean="0"/>
+              <a:rPr lang="en-US"/>
               <a:t>Fifth level</a:t>
             </a:r>
-            <a:endParaRPr lang="en-US"/>
           </a:p>
         </p:txBody>
       </p:sp>
@@ -461,7 +477,7 @@
             <a:fld id="{1D8BD707-D9CF-40AE-B4C6-C98DA3205C09}" type="datetimeFigureOut">
               <a:rPr lang="en-US" smtClean="0"/>
               <a:pPr/>
-              <a:t>12/14/2017</a:t>
+              <a:t>12/19/2017</a:t>
             </a:fld>
             <a:endParaRPr lang="en-US"/>
           </a:p>
@@ -556,10 +572,9 @@
           <a:lstStyle/>
           <a:p>
             <a:r>
-              <a:rPr lang="en-US" smtClean="0"/>
+              <a:rPr lang="en-US"/>
               <a:t>Click to edit Master title style</a:t>
             </a:r>
-            <a:endParaRPr lang="en-US"/>
           </a:p>
         </p:txBody>
       </p:sp>
@@ -585,38 +600,37 @@
           <a:p>
             <a:pPr lvl="0"/>
             <a:r>
-              <a:rPr lang="en-US" smtClean="0"/>
+              <a:rPr lang="en-US"/>
               <a:t>Click to edit Master text styles</a:t>
             </a:r>
           </a:p>
           <a:p>
             <a:pPr lvl="1"/>
             <a:r>
-              <a:rPr lang="en-US" smtClean="0"/>
+              <a:rPr lang="en-US"/>
               <a:t>Second level</a:t>
             </a:r>
           </a:p>
           <a:p>
             <a:pPr lvl="2"/>
             <a:r>
-              <a:rPr lang="en-US" smtClean="0"/>
+              <a:rPr lang="en-US"/>
               <a:t>Third level</a:t>
             </a:r>
           </a:p>
           <a:p>
             <a:pPr lvl="3"/>
             <a:r>
-              <a:rPr lang="en-US" smtClean="0"/>
+              <a:rPr lang="en-US"/>
               <a:t>Fourth level</a:t>
             </a:r>
           </a:p>
           <a:p>
             <a:pPr lvl="4"/>
             <a:r>
-              <a:rPr lang="en-US" smtClean="0"/>
+              <a:rPr lang="en-US"/>
               <a:t>Fifth level</a:t>
             </a:r>
-            <a:endParaRPr lang="en-US"/>
           </a:p>
         </p:txBody>
       </p:sp>
@@ -638,7 +652,7 @@
             <a:fld id="{1D8BD707-D9CF-40AE-B4C6-C98DA3205C09}" type="datetimeFigureOut">
               <a:rPr lang="en-US" smtClean="0"/>
               <a:pPr/>
-              <a:t>12/14/2017</a:t>
+              <a:t>12/19/2017</a:t>
             </a:fld>
             <a:endParaRPr lang="en-US"/>
           </a:p>
@@ -728,10 +742,9 @@
           <a:lstStyle/>
           <a:p>
             <a:r>
-              <a:rPr lang="en-US" smtClean="0"/>
+              <a:rPr lang="en-US"/>
               <a:t>Click to edit Master title style</a:t>
             </a:r>
-            <a:endParaRPr lang="en-US"/>
           </a:p>
         </p:txBody>
       </p:sp>
@@ -752,38 +765,37 @@
           <a:p>
             <a:pPr lvl="0"/>
             <a:r>
-              <a:rPr lang="en-US" smtClean="0"/>
+              <a:rPr lang="en-US"/>
               <a:t>Click to edit Master text styles</a:t>
             </a:r>
           </a:p>
           <a:p>
             <a:pPr lvl="1"/>
             <a:r>
-              <a:rPr lang="en-US" smtClean="0"/>
+              <a:rPr lang="en-US"/>
               <a:t>Second level</a:t>
             </a:r>
           </a:p>
           <a:p>
             <a:pPr lvl="2"/>
             <a:r>
-              <a:rPr lang="en-US" smtClean="0"/>
+              <a:rPr lang="en-US"/>
               <a:t>Third level</a:t>
             </a:r>
           </a:p>
           <a:p>
             <a:pPr lvl="3"/>
             <a:r>
-              <a:rPr lang="en-US" smtClean="0"/>
+              <a:rPr lang="en-US"/>
               <a:t>Fourth level</a:t>
             </a:r>
           </a:p>
           <a:p>
             <a:pPr lvl="4"/>
             <a:r>
-              <a:rPr lang="en-US" smtClean="0"/>
+              <a:rPr lang="en-US"/>
               <a:t>Fifth level</a:t>
             </a:r>
-            <a:endParaRPr lang="en-US"/>
           </a:p>
         </p:txBody>
       </p:sp>
@@ -805,7 +817,7 @@
             <a:fld id="{1D8BD707-D9CF-40AE-B4C6-C98DA3205C09}" type="datetimeFigureOut">
               <a:rPr lang="en-US" smtClean="0"/>
               <a:pPr/>
-              <a:t>12/14/2017</a:t>
+              <a:t>12/19/2017</a:t>
             </a:fld>
             <a:endParaRPr lang="en-US"/>
           </a:p>
@@ -904,10 +916,9 @@
           </a:lstStyle>
           <a:p>
             <a:r>
-              <a:rPr lang="en-US" smtClean="0"/>
+              <a:rPr lang="en-US"/>
               <a:t>Click to edit Master title style</a:t>
             </a:r>
-            <a:endParaRPr lang="en-US"/>
           </a:p>
         </p:txBody>
       </p:sp>
@@ -1024,7 +1035,7 @@
           <a:p>
             <a:pPr lvl="0"/>
             <a:r>
-              <a:rPr lang="en-US" smtClean="0"/>
+              <a:rPr lang="en-US"/>
               <a:t>Click to edit Master text styles</a:t>
             </a:r>
           </a:p>
@@ -1048,7 +1059,7 @@
             <a:fld id="{1D8BD707-D9CF-40AE-B4C6-C98DA3205C09}" type="datetimeFigureOut">
               <a:rPr lang="en-US" smtClean="0"/>
               <a:pPr/>
-              <a:t>12/14/2017</a:t>
+              <a:t>12/19/2017</a:t>
             </a:fld>
             <a:endParaRPr lang="en-US"/>
           </a:p>
@@ -1138,10 +1149,9 @@
           <a:lstStyle/>
           <a:p>
             <a:r>
-              <a:rPr lang="en-US" smtClean="0"/>
+              <a:rPr lang="en-US"/>
               <a:t>Click to edit Master title style</a:t>
             </a:r>
-            <a:endParaRPr lang="en-US"/>
           </a:p>
         </p:txBody>
       </p:sp>
@@ -1195,38 +1205,37 @@
           <a:p>
             <a:pPr lvl="0"/>
             <a:r>
-              <a:rPr lang="en-US" smtClean="0"/>
+              <a:rPr lang="en-US"/>
               <a:t>Click to edit Master text styles</a:t>
             </a:r>
           </a:p>
           <a:p>
             <a:pPr lvl="1"/>
             <a:r>
-              <a:rPr lang="en-US" smtClean="0"/>
+              <a:rPr lang="en-US"/>
               <a:t>Second level</a:t>
             </a:r>
           </a:p>
           <a:p>
             <a:pPr lvl="2"/>
             <a:r>
-              <a:rPr lang="en-US" smtClean="0"/>
+              <a:rPr lang="en-US"/>
               <a:t>Third level</a:t>
             </a:r>
           </a:p>
           <a:p>
             <a:pPr lvl="3"/>
             <a:r>
-              <a:rPr lang="en-US" smtClean="0"/>
+              <a:rPr lang="en-US"/>
               <a:t>Fourth level</a:t>
             </a:r>
           </a:p>
           <a:p>
             <a:pPr lvl="4"/>
             <a:r>
-              <a:rPr lang="en-US" smtClean="0"/>
+              <a:rPr lang="en-US"/>
               <a:t>Fifth level</a:t>
             </a:r>
-            <a:endParaRPr lang="en-US"/>
           </a:p>
         </p:txBody>
       </p:sp>
@@ -1280,38 +1289,37 @@
           <a:p>
             <a:pPr lvl="0"/>
             <a:r>
-              <a:rPr lang="en-US" smtClean="0"/>
+              <a:rPr lang="en-US"/>
               <a:t>Click to edit Master text styles</a:t>
             </a:r>
           </a:p>
           <a:p>
             <a:pPr lvl="1"/>
             <a:r>
-              <a:rPr lang="en-US" smtClean="0"/>
+              <a:rPr lang="en-US"/>
               <a:t>Second level</a:t>
             </a:r>
           </a:p>
           <a:p>
             <a:pPr lvl="2"/>
             <a:r>
-              <a:rPr lang="en-US" smtClean="0"/>
+              <a:rPr lang="en-US"/>
               <a:t>Third level</a:t>
             </a:r>
           </a:p>
           <a:p>
             <a:pPr lvl="3"/>
             <a:r>
-              <a:rPr lang="en-US" smtClean="0"/>
+              <a:rPr lang="en-US"/>
               <a:t>Fourth level</a:t>
             </a:r>
           </a:p>
           <a:p>
             <a:pPr lvl="4"/>
             <a:r>
-              <a:rPr lang="en-US" smtClean="0"/>
+              <a:rPr lang="en-US"/>
               <a:t>Fifth level</a:t>
             </a:r>
-            <a:endParaRPr lang="en-US"/>
           </a:p>
         </p:txBody>
       </p:sp>
@@ -1333,7 +1341,7 @@
             <a:fld id="{1D8BD707-D9CF-40AE-B4C6-C98DA3205C09}" type="datetimeFigureOut">
               <a:rPr lang="en-US" smtClean="0"/>
               <a:pPr/>
-              <a:t>12/14/2017</a:t>
+              <a:t>12/19/2017</a:t>
             </a:fld>
             <a:endParaRPr lang="en-US"/>
           </a:p>
@@ -1427,10 +1435,9 @@
           </a:lstStyle>
           <a:p>
             <a:r>
-              <a:rPr lang="en-US" smtClean="0"/>
+              <a:rPr lang="en-US"/>
               <a:t>Click to edit Master title style</a:t>
             </a:r>
-            <a:endParaRPr lang="en-US"/>
           </a:p>
         </p:txBody>
       </p:sp>
@@ -1493,7 +1500,7 @@
           <a:p>
             <a:pPr lvl="0"/>
             <a:r>
-              <a:rPr lang="en-US" smtClean="0"/>
+              <a:rPr lang="en-US"/>
               <a:t>Click to edit Master text styles</a:t>
             </a:r>
           </a:p>
@@ -1549,38 +1556,37 @@
           <a:p>
             <a:pPr lvl="0"/>
             <a:r>
-              <a:rPr lang="en-US" smtClean="0"/>
+              <a:rPr lang="en-US"/>
               <a:t>Click to edit Master text styles</a:t>
             </a:r>
           </a:p>
           <a:p>
             <a:pPr lvl="1"/>
             <a:r>
-              <a:rPr lang="en-US" smtClean="0"/>
+              <a:rPr lang="en-US"/>
               <a:t>Second level</a:t>
             </a:r>
           </a:p>
           <a:p>
             <a:pPr lvl="2"/>
             <a:r>
-              <a:rPr lang="en-US" smtClean="0"/>
+              <a:rPr lang="en-US"/>
               <a:t>Third level</a:t>
             </a:r>
           </a:p>
           <a:p>
             <a:pPr lvl="3"/>
             <a:r>
-              <a:rPr lang="en-US" smtClean="0"/>
+              <a:rPr lang="en-US"/>
               <a:t>Fourth level</a:t>
             </a:r>
           </a:p>
           <a:p>
             <a:pPr lvl="4"/>
             <a:r>
-              <a:rPr lang="en-US" smtClean="0"/>
+              <a:rPr lang="en-US"/>
               <a:t>Fifth level</a:t>
             </a:r>
-            <a:endParaRPr lang="en-US"/>
           </a:p>
         </p:txBody>
       </p:sp>
@@ -1643,7 +1649,7 @@
           <a:p>
             <a:pPr lvl="0"/>
             <a:r>
-              <a:rPr lang="en-US" smtClean="0"/>
+              <a:rPr lang="en-US"/>
               <a:t>Click to edit Master text styles</a:t>
             </a:r>
           </a:p>
@@ -1699,38 +1705,37 @@
           <a:p>
             <a:pPr lvl="0"/>
             <a:r>
-              <a:rPr lang="en-US" smtClean="0"/>
+              <a:rPr lang="en-US"/>
               <a:t>Click to edit Master text styles</a:t>
             </a:r>
           </a:p>
           <a:p>
             <a:pPr lvl="1"/>
             <a:r>
-              <a:rPr lang="en-US" smtClean="0"/>
+              <a:rPr lang="en-US"/>
               <a:t>Second level</a:t>
             </a:r>
           </a:p>
           <a:p>
             <a:pPr lvl="2"/>
             <a:r>
-              <a:rPr lang="en-US" smtClean="0"/>
+              <a:rPr lang="en-US"/>
               <a:t>Third level</a:t>
             </a:r>
           </a:p>
           <a:p>
             <a:pPr lvl="3"/>
             <a:r>
-              <a:rPr lang="en-US" smtClean="0"/>
+              <a:rPr lang="en-US"/>
               <a:t>Fourth level</a:t>
             </a:r>
           </a:p>
           <a:p>
             <a:pPr lvl="4"/>
             <a:r>
-              <a:rPr lang="en-US" smtClean="0"/>
+              <a:rPr lang="en-US"/>
               <a:t>Fifth level</a:t>
             </a:r>
-            <a:endParaRPr lang="en-US"/>
           </a:p>
         </p:txBody>
       </p:sp>
@@ -1752,7 +1757,7 @@
             <a:fld id="{1D8BD707-D9CF-40AE-B4C6-C98DA3205C09}" type="datetimeFigureOut">
               <a:rPr lang="en-US" smtClean="0"/>
               <a:pPr/>
-              <a:t>12/14/2017</a:t>
+              <a:t>12/19/2017</a:t>
             </a:fld>
             <a:endParaRPr lang="en-US"/>
           </a:p>
@@ -1842,10 +1847,9 @@
           <a:lstStyle/>
           <a:p>
             <a:r>
-              <a:rPr lang="en-US" smtClean="0"/>
+              <a:rPr lang="en-US"/>
               <a:t>Click to edit Master title style</a:t>
             </a:r>
-            <a:endParaRPr lang="en-US"/>
           </a:p>
         </p:txBody>
       </p:sp>
@@ -1867,7 +1871,7 @@
             <a:fld id="{1D8BD707-D9CF-40AE-B4C6-C98DA3205C09}" type="datetimeFigureOut">
               <a:rPr lang="en-US" smtClean="0"/>
               <a:pPr/>
-              <a:t>12/14/2017</a:t>
+              <a:t>12/19/2017</a:t>
             </a:fld>
             <a:endParaRPr lang="en-US"/>
           </a:p>
@@ -1959,7 +1963,7 @@
             <a:fld id="{1D8BD707-D9CF-40AE-B4C6-C98DA3205C09}" type="datetimeFigureOut">
               <a:rPr lang="en-US" smtClean="0"/>
               <a:pPr/>
-              <a:t>12/14/2017</a:t>
+              <a:t>12/19/2017</a:t>
             </a:fld>
             <a:endParaRPr lang="en-US"/>
           </a:p>
@@ -2058,10 +2062,9 @@
           </a:lstStyle>
           <a:p>
             <a:r>
-              <a:rPr lang="en-US" smtClean="0"/>
+              <a:rPr lang="en-US"/>
               <a:t>Click to edit Master title style</a:t>
             </a:r>
-            <a:endParaRPr lang="en-US"/>
           </a:p>
         </p:txBody>
       </p:sp>
@@ -2115,38 +2118,37 @@
           <a:p>
             <a:pPr lvl="0"/>
             <a:r>
-              <a:rPr lang="en-US" smtClean="0"/>
+              <a:rPr lang="en-US"/>
               <a:t>Click to edit Master text styles</a:t>
             </a:r>
           </a:p>
           <a:p>
             <a:pPr lvl="1"/>
             <a:r>
-              <a:rPr lang="en-US" smtClean="0"/>
+              <a:rPr lang="en-US"/>
               <a:t>Second level</a:t>
             </a:r>
           </a:p>
           <a:p>
             <a:pPr lvl="2"/>
             <a:r>
-              <a:rPr lang="en-US" smtClean="0"/>
+              <a:rPr lang="en-US"/>
               <a:t>Third level</a:t>
             </a:r>
           </a:p>
           <a:p>
             <a:pPr lvl="3"/>
             <a:r>
-              <a:rPr lang="en-US" smtClean="0"/>
+              <a:rPr lang="en-US"/>
               <a:t>Fourth level</a:t>
             </a:r>
           </a:p>
           <a:p>
             <a:pPr lvl="4"/>
             <a:r>
-              <a:rPr lang="en-US" smtClean="0"/>
+              <a:rPr lang="en-US"/>
               <a:t>Fifth level</a:t>
             </a:r>
-            <a:endParaRPr lang="en-US"/>
           </a:p>
         </p:txBody>
       </p:sp>
@@ -2209,7 +2211,7 @@
           <a:p>
             <a:pPr lvl="0"/>
             <a:r>
-              <a:rPr lang="en-US" smtClean="0"/>
+              <a:rPr lang="en-US"/>
               <a:t>Click to edit Master text styles</a:t>
             </a:r>
           </a:p>
@@ -2233,7 +2235,7 @@
             <a:fld id="{1D8BD707-D9CF-40AE-B4C6-C98DA3205C09}" type="datetimeFigureOut">
               <a:rPr lang="en-US" smtClean="0"/>
               <a:pPr/>
-              <a:t>12/14/2017</a:t>
+              <a:t>12/19/2017</a:t>
             </a:fld>
             <a:endParaRPr lang="en-US"/>
           </a:p>
@@ -2332,10 +2334,9 @@
           </a:lstStyle>
           <a:p>
             <a:r>
-              <a:rPr lang="en-US" smtClean="0"/>
+              <a:rPr lang="en-US"/>
               <a:t>Click to edit Master title style</a:t>
             </a:r>
-            <a:endParaRPr lang="en-US"/>
           </a:p>
         </p:txBody>
       </p:sp>
@@ -2459,7 +2460,7 @@
           <a:p>
             <a:pPr lvl="0"/>
             <a:r>
-              <a:rPr lang="en-US" smtClean="0"/>
+              <a:rPr lang="en-US"/>
               <a:t>Click to edit Master text styles</a:t>
             </a:r>
           </a:p>
@@ -2483,7 +2484,7 @@
             <a:fld id="{1D8BD707-D9CF-40AE-B4C6-C98DA3205C09}" type="datetimeFigureOut">
               <a:rPr lang="en-US" smtClean="0"/>
               <a:pPr/>
-              <a:t>12/14/2017</a:t>
+              <a:t>12/19/2017</a:t>
             </a:fld>
             <a:endParaRPr lang="en-US"/>
           </a:p>
@@ -2588,10 +2589,9 @@
           <a:lstStyle/>
           <a:p>
             <a:r>
-              <a:rPr lang="en-US" smtClean="0"/>
+              <a:rPr lang="en-US"/>
               <a:t>Click to edit Master title style</a:t>
             </a:r>
-            <a:endParaRPr lang="en-US"/>
           </a:p>
         </p:txBody>
       </p:sp>
@@ -2622,38 +2622,37 @@
           <a:p>
             <a:pPr lvl="0"/>
             <a:r>
-              <a:rPr lang="en-US" smtClean="0"/>
+              <a:rPr lang="en-US"/>
               <a:t>Click to edit Master text styles</a:t>
             </a:r>
           </a:p>
           <a:p>
             <a:pPr lvl="1"/>
             <a:r>
-              <a:rPr lang="en-US" smtClean="0"/>
+              <a:rPr lang="en-US"/>
               <a:t>Second level</a:t>
             </a:r>
           </a:p>
           <a:p>
             <a:pPr lvl="2"/>
             <a:r>
-              <a:rPr lang="en-US" smtClean="0"/>
+              <a:rPr lang="en-US"/>
               <a:t>Third level</a:t>
             </a:r>
           </a:p>
           <a:p>
             <a:pPr lvl="3"/>
             <a:r>
-              <a:rPr lang="en-US" smtClean="0"/>
+              <a:rPr lang="en-US"/>
               <a:t>Fourth level</a:t>
             </a:r>
           </a:p>
           <a:p>
             <a:pPr lvl="4"/>
             <a:r>
-              <a:rPr lang="en-US" smtClean="0"/>
+              <a:rPr lang="en-US"/>
               <a:t>Fifth level</a:t>
             </a:r>
-            <a:endParaRPr lang="en-US"/>
           </a:p>
         </p:txBody>
       </p:sp>
@@ -2693,7 +2692,7 @@
             <a:fld id="{1D8BD707-D9CF-40AE-B4C6-C98DA3205C09}" type="datetimeFigureOut">
               <a:rPr lang="en-US" smtClean="0"/>
               <a:pPr/>
-              <a:t>12/14/2017</a:t>
+              <a:t>12/19/2017</a:t>
             </a:fld>
             <a:endParaRPr lang="en-US"/>
           </a:p>
@@ -3100,10 +3099,9 @@
           <a:lstStyle/>
           <a:p>
             <a:r>
-              <a:rPr lang="en-US" sz="1200" dirty="0" smtClean="0"/>
+              <a:rPr lang="en-US" sz="1200" dirty="0"/>
               <a:t>Application Start</a:t>
             </a:r>
-            <a:endParaRPr lang="en-US" sz="1200" dirty="0"/>
           </a:p>
         </p:txBody>
       </p:sp>
@@ -3143,10 +3141,9 @@
           <a:lstStyle/>
           <a:p>
             <a:r>
-              <a:rPr lang="en-US" sz="1200" dirty="0" smtClean="0"/>
+              <a:rPr lang="en-US" sz="1200" dirty="0"/>
               <a:t>Display form with 2 Buttons</a:t>
             </a:r>
-            <a:endParaRPr lang="en-US" sz="1200" dirty="0"/>
           </a:p>
         </p:txBody>
       </p:sp>
@@ -3439,16 +3436,15 @@
           <a:lstStyle/>
           <a:p>
             <a:r>
-              <a:rPr lang="en-US" sz="1100" dirty="0" smtClean="0"/>
+              <a:rPr lang="en-US" sz="1100" dirty="0"/>
               <a:t>Student will place their finger on the reader and automatically  Detect fingerprints and login the student and display a message “You’re logged in” this form will be maximized on the screen</a:t>
             </a:r>
           </a:p>
           <a:p>
             <a:r>
-              <a:rPr lang="en-US" sz="1100" dirty="0" smtClean="0"/>
+              <a:rPr lang="en-US" sz="1100" dirty="0"/>
               <a:t>The task of this form is to wait for student to login will be open all the time</a:t>
             </a:r>
-            <a:endParaRPr lang="en-US" sz="1100" dirty="0"/>
           </a:p>
         </p:txBody>
       </p:sp>
@@ -3581,10 +3577,9 @@
           <a:lstStyle/>
           <a:p>
             <a:r>
-              <a:rPr lang="en-US" sz="1100" dirty="0" smtClean="0"/>
+              <a:rPr lang="en-US" sz="1100" dirty="0"/>
               <a:t>Admin will double click on the application</a:t>
             </a:r>
-            <a:endParaRPr lang="en-US" sz="1100" dirty="0"/>
           </a:p>
         </p:txBody>
       </p:sp>
@@ -3624,10 +3619,9 @@
           <a:lstStyle/>
           <a:p>
             <a:r>
-              <a:rPr lang="en-US" dirty="0" smtClean="0"/>
+              <a:rPr lang="en-US" dirty="0"/>
               <a:t>See next slide</a:t>
             </a:r>
-            <a:endParaRPr lang="en-US" dirty="0"/>
           </a:p>
         </p:txBody>
       </p:sp>
@@ -3677,13 +3671,6 @@
   <p:clrMapOvr>
     <a:masterClrMapping/>
   </p:clrMapOvr>
-  <p:timing>
-    <p:tnLst>
-      <p:par>
-        <p:cTn id="1" dur="indefinite" restart="never" nodeType="tmRoot"/>
-      </p:par>
-    </p:tnLst>
-  </p:timing>
 </p:sld>
 </file>
 
@@ -3822,14 +3809,9 @@
           <a:lstStyle/>
           <a:p>
             <a:r>
-              <a:rPr lang="en-US" sz="1200" dirty="0" smtClean="0"/>
-              <a:t>If admin username &amp; password OK allow login  and display the </a:t>
-            </a:r>
-            <a:r>
-              <a:rPr lang="en-US" sz="1200" dirty="0" smtClean="0"/>
-              <a:t>admin form to manager students database connection detect scanner, admin accounts </a:t>
-            </a:r>
-            <a:endParaRPr lang="en-US" sz="1200" dirty="0" smtClean="0"/>
+              <a:rPr lang="en-US" sz="1200" dirty="0"/>
+              <a:t>If admin username &amp; password OK allow login  and display the admin form to manager students database connection detect scanner, admin accounts </a:t>
+            </a:r>
           </a:p>
         </p:txBody>
       </p:sp>
@@ -3860,7 +3842,7 @@
               <a:buChar char="•"/>
             </a:pPr>
             <a:r>
-              <a:rPr lang="en-US" sz="1100" dirty="0" smtClean="0"/>
+              <a:rPr lang="en-US" sz="1100" dirty="0"/>
               <a:t>Select Student and Click on Edit, it will load the selected student data and allow admin to edit student data then save it</a:t>
             </a:r>
           </a:p>
@@ -3873,10 +3855,9 @@
               <a:buChar char="•"/>
             </a:pPr>
             <a:r>
-              <a:rPr lang="en-US" sz="1100" dirty="0" smtClean="0"/>
+              <a:rPr lang="en-US" sz="1100" dirty="0"/>
               <a:t>Select number of Student then Click on Delete selected it will delete all the selected students</a:t>
             </a:r>
-            <a:endParaRPr lang="en-US" sz="1100" dirty="0"/>
           </a:p>
         </p:txBody>
       </p:sp>
@@ -3916,28 +3897,27 @@
           <a:lstStyle/>
           <a:p>
             <a:r>
-              <a:rPr lang="en-US" sz="1100" dirty="0" smtClean="0"/>
+              <a:rPr lang="en-US" sz="1100" dirty="0"/>
               <a:t>Student can login</a:t>
             </a:r>
           </a:p>
           <a:p>
             <a:r>
-              <a:rPr lang="en-US" sz="1100" dirty="0" smtClean="0"/>
+              <a:rPr lang="en-US" sz="1100" dirty="0"/>
               <a:t>Monday to Friday</a:t>
             </a:r>
           </a:p>
           <a:p>
             <a:r>
-              <a:rPr lang="en-US" sz="1100" dirty="0" smtClean="0"/>
+              <a:rPr lang="en-US" sz="1100" dirty="0"/>
               <a:t>Or </a:t>
             </a:r>
           </a:p>
           <a:p>
             <a:r>
-              <a:rPr lang="en-US" sz="1100" dirty="0" smtClean="0"/>
+              <a:rPr lang="en-US" sz="1100" dirty="0"/>
               <a:t>Saturday only</a:t>
             </a:r>
-            <a:endParaRPr lang="en-US" sz="1100" dirty="0"/>
           </a:p>
         </p:txBody>
       </p:sp>
@@ -4035,13 +4015,6 @@
   <p:clrMapOvr>
     <a:masterClrMapping/>
   </p:clrMapOvr>
-  <p:timing>
-    <p:tnLst>
-      <p:par>
-        <p:cTn id="1" dur="indefinite" restart="never" nodeType="tmRoot"/>
-      </p:par>
-    </p:tnLst>
-  </p:timing>
 </p:sld>
 </file>
 
@@ -4149,16 +4122,15 @@
           <a:lstStyle/>
           <a:p>
             <a:r>
-              <a:rPr lang="en-US" dirty="0" smtClean="0"/>
+              <a:rPr lang="en-US" dirty="0"/>
               <a:t>Allow admin to setup the database connect</a:t>
             </a:r>
           </a:p>
           <a:p>
             <a:r>
-              <a:rPr lang="en-US" dirty="0" smtClean="0"/>
+              <a:rPr lang="en-US" dirty="0"/>
               <a:t>IP Address, Port, Username, Password, and Database name</a:t>
             </a:r>
-            <a:endParaRPr lang="en-US" dirty="0"/>
           </a:p>
         </p:txBody>
       </p:sp>
@@ -4218,13 +4190,6 @@
   <p:clrMapOvr>
     <a:masterClrMapping/>
   </p:clrMapOvr>
-  <p:timing>
-    <p:tnLst>
-      <p:par>
-        <p:cTn id="1" dur="indefinite" restart="never" nodeType="tmRoot"/>
-      </p:par>
-    </p:tnLst>
-  </p:timing>
 </p:sld>
 </file>
 
@@ -4332,16 +4297,15 @@
           <a:lstStyle/>
           <a:p>
             <a:r>
-              <a:rPr lang="en-US" dirty="0" smtClean="0"/>
+              <a:rPr lang="en-US" dirty="0"/>
               <a:t>Allow admin to check if fingerprint scanner is connected or no and display </a:t>
             </a:r>
           </a:p>
           <a:p>
             <a:r>
-              <a:rPr lang="en-US" dirty="0" smtClean="0"/>
+              <a:rPr lang="en-US" dirty="0"/>
               <a:t>Message Ok in green color, not detected in red color</a:t>
             </a:r>
-            <a:endParaRPr lang="en-US" dirty="0"/>
           </a:p>
         </p:txBody>
       </p:sp>
@@ -4508,10 +4472,9 @@
           <a:lstStyle/>
           <a:p>
             <a:r>
-              <a:rPr lang="en-US" dirty="0" smtClean="0"/>
+              <a:rPr lang="en-US" dirty="0"/>
               <a:t>Allow admin to set the admin username and password</a:t>
             </a:r>
-            <a:endParaRPr lang="en-US" dirty="0"/>
           </a:p>
         </p:txBody>
       </p:sp>
@@ -4683,10 +4646,9 @@
           <a:lstStyle/>
           <a:p>
             <a:r>
-              <a:rPr lang="en-US" sz="1050" dirty="0" smtClean="0"/>
+              <a:rPr lang="en-US" sz="1050" dirty="0"/>
               <a:t>Where Admin Username &amp; Password will be Saved</a:t>
             </a:r>
-            <a:endParaRPr lang="en-US" sz="1050" dirty="0"/>
           </a:p>
         </p:txBody>
       </p:sp>
@@ -4803,10 +4765,9 @@
           <a:lstStyle/>
           <a:p>
             <a:r>
-              <a:rPr lang="en-US" sz="1050" dirty="0" smtClean="0"/>
+              <a:rPr lang="en-US" sz="1050" dirty="0"/>
               <a:t>Students Account</a:t>
             </a:r>
-            <a:endParaRPr lang="en-US" sz="1050" dirty="0"/>
           </a:p>
         </p:txBody>
       </p:sp>
@@ -4968,10 +4929,9 @@
           <a:lstStyle/>
           <a:p>
             <a:r>
-              <a:rPr lang="en-US" sz="1050" dirty="0" smtClean="0"/>
+              <a:rPr lang="en-US" sz="1050" dirty="0"/>
               <a:t>Where daily login data will be saved</a:t>
             </a:r>
-            <a:endParaRPr lang="en-US" sz="1050" dirty="0"/>
           </a:p>
         </p:txBody>
       </p:sp>

</xml_diff>